<commit_message>
updated the title in the final visualization
</commit_message>
<xml_diff>
--- a/Northwest Airlines Historical MSP Intl Service/Annotations.pptx
+++ b/Northwest Airlines Historical MSP Intl Service/Annotations.pptx
@@ -104,7 +104,73 @@
       </a:defRPr>
     </a:lvl9pPr>
   </p:defaultTextStyle>
+  <p:extLst>
+    <p:ext uri="{EFAFB233-063F-42B5-8137-9DF3F51BA10A}">
+      <p15:sldGuideLst xmlns:p15="http://schemas.microsoft.com/office/powerpoint/2012/main"/>
+    </p:ext>
+  </p:extLst>
 </p:presentation>
+</file>
+
+<file path=ppt/revisionInfo.xml><?xml version="1.0" encoding="utf-8"?>
+<p1510:revInfo xmlns:a="http://schemas.openxmlformats.org/drawingml/2006/main" xmlns:r="http://schemas.openxmlformats.org/officeDocument/2006/relationships" xmlns:p1510="http://schemas.microsoft.com/office/powerpoint/2015/10/main">
+  <p1510:revLst>
+    <p1510:client id="{B5A26B87-F426-4901-8A3C-C3C04AA11289}" v="3" dt="2023-05-22T11:21:01.284"/>
+  </p1510:revLst>
+</p1510:revInfo>
+</file>
+
+<file path=ppt/changesInfos/changesInfo1.xml><?xml version="1.0" encoding="utf-8"?>
+<pc:chgInfo xmlns:a="http://schemas.openxmlformats.org/drawingml/2006/main" xmlns:r="http://schemas.openxmlformats.org/officeDocument/2006/relationships" xmlns:ac="http://schemas.microsoft.com/office/drawing/2013/main/command" xmlns:pc="http://schemas.microsoft.com/office/powerpoint/2013/main/command">
+  <pc:docChgLst>
+    <pc:chgData name="Alexander Elfering" userId="4911788d8c382ac3" providerId="LiveId" clId="{B5A26B87-F426-4901-8A3C-C3C04AA11289}"/>
+    <pc:docChg chg="custSel modSld">
+      <pc:chgData name="Alexander Elfering" userId="4911788d8c382ac3" providerId="LiveId" clId="{B5A26B87-F426-4901-8A3C-C3C04AA11289}" dt="2023-05-22T11:21:03.464" v="12" actId="167"/>
+      <pc:docMkLst>
+        <pc:docMk/>
+      </pc:docMkLst>
+      <pc:sldChg chg="addSp delSp modSp mod">
+        <pc:chgData name="Alexander Elfering" userId="4911788d8c382ac3" providerId="LiveId" clId="{B5A26B87-F426-4901-8A3C-C3C04AA11289}" dt="2023-05-22T11:21:03.464" v="12" actId="167"/>
+        <pc:sldMkLst>
+          <pc:docMk/>
+          <pc:sldMk cId="952050780" sldId="258"/>
+        </pc:sldMkLst>
+        <pc:picChg chg="del">
+          <ac:chgData name="Alexander Elfering" userId="4911788d8c382ac3" providerId="LiveId" clId="{B5A26B87-F426-4901-8A3C-C3C04AA11289}" dt="2023-05-22T11:20:01.617" v="0" actId="478"/>
+          <ac:picMkLst>
+            <pc:docMk/>
+            <pc:sldMk cId="952050780" sldId="258"/>
+            <ac:picMk id="3" creationId="{0EBFA541-23B8-F0D8-3AAC-1C641621B48D}"/>
+          </ac:picMkLst>
+        </pc:picChg>
+        <pc:picChg chg="add del mod">
+          <ac:chgData name="Alexander Elfering" userId="4911788d8c382ac3" providerId="LiveId" clId="{B5A26B87-F426-4901-8A3C-C3C04AA11289}" dt="2023-05-22T11:20:42.013" v="4" actId="478"/>
+          <ac:picMkLst>
+            <pc:docMk/>
+            <pc:sldMk cId="952050780" sldId="258"/>
+            <ac:picMk id="10" creationId="{838F03BB-5E02-BA77-96A3-5A5AFD3A11FB}"/>
+          </ac:picMkLst>
+        </pc:picChg>
+        <pc:picChg chg="add del mod">
+          <ac:chgData name="Alexander Elfering" userId="4911788d8c382ac3" providerId="LiveId" clId="{B5A26B87-F426-4901-8A3C-C3C04AA11289}" dt="2023-05-22T11:20:56.312" v="8" actId="478"/>
+          <ac:picMkLst>
+            <pc:docMk/>
+            <pc:sldMk cId="952050780" sldId="258"/>
+            <ac:picMk id="15" creationId="{8299ADED-C3D0-FBB9-C289-14B56B3533DF}"/>
+          </ac:picMkLst>
+        </pc:picChg>
+        <pc:picChg chg="add mod ord">
+          <ac:chgData name="Alexander Elfering" userId="4911788d8c382ac3" providerId="LiveId" clId="{B5A26B87-F426-4901-8A3C-C3C04AA11289}" dt="2023-05-22T11:21:03.464" v="12" actId="167"/>
+          <ac:picMkLst>
+            <pc:docMk/>
+            <pc:sldMk cId="952050780" sldId="258"/>
+            <ac:picMk id="17" creationId="{49B2A806-62BA-BB21-47C4-4A70E7D046E7}"/>
+          </ac:picMkLst>
+        </pc:picChg>
+      </pc:sldChg>
+    </pc:docChg>
+  </pc:docChgLst>
+</pc:chgInfo>
 </file>
 
 <file path=ppt/slideLayouts/slideLayout1.xml><?xml version="1.0" encoding="utf-8"?>
@@ -238,7 +304,7 @@
           <a:p>
             <a:fld id="{00BA600E-F723-40D0-A6BB-4CB8C3CAB9D0}" type="datetimeFigureOut">
               <a:rPr lang="en-US" smtClean="0"/>
-              <a:t>5/19/2023</a:t>
+              <a:t>5/22/2023</a:t>
             </a:fld>
             <a:endParaRPr lang="en-US"/>
           </a:p>
@@ -408,7 +474,7 @@
           <a:p>
             <a:fld id="{00BA600E-F723-40D0-A6BB-4CB8C3CAB9D0}" type="datetimeFigureOut">
               <a:rPr lang="en-US" smtClean="0"/>
-              <a:t>5/19/2023</a:t>
+              <a:t>5/22/2023</a:t>
             </a:fld>
             <a:endParaRPr lang="en-US"/>
           </a:p>
@@ -588,7 +654,7 @@
           <a:p>
             <a:fld id="{00BA600E-F723-40D0-A6BB-4CB8C3CAB9D0}" type="datetimeFigureOut">
               <a:rPr lang="en-US" smtClean="0"/>
-              <a:t>5/19/2023</a:t>
+              <a:t>5/22/2023</a:t>
             </a:fld>
             <a:endParaRPr lang="en-US"/>
           </a:p>
@@ -758,7 +824,7 @@
           <a:p>
             <a:fld id="{00BA600E-F723-40D0-A6BB-4CB8C3CAB9D0}" type="datetimeFigureOut">
               <a:rPr lang="en-US" smtClean="0"/>
-              <a:t>5/19/2023</a:t>
+              <a:t>5/22/2023</a:t>
             </a:fld>
             <a:endParaRPr lang="en-US"/>
           </a:p>
@@ -1002,7 +1068,7 @@
           <a:p>
             <a:fld id="{00BA600E-F723-40D0-A6BB-4CB8C3CAB9D0}" type="datetimeFigureOut">
               <a:rPr lang="en-US" smtClean="0"/>
-              <a:t>5/19/2023</a:t>
+              <a:t>5/22/2023</a:t>
             </a:fld>
             <a:endParaRPr lang="en-US"/>
           </a:p>
@@ -1234,7 +1300,7 @@
           <a:p>
             <a:fld id="{00BA600E-F723-40D0-A6BB-4CB8C3CAB9D0}" type="datetimeFigureOut">
               <a:rPr lang="en-US" smtClean="0"/>
-              <a:t>5/19/2023</a:t>
+              <a:t>5/22/2023</a:t>
             </a:fld>
             <a:endParaRPr lang="en-US"/>
           </a:p>
@@ -1601,7 +1667,7 @@
           <a:p>
             <a:fld id="{00BA600E-F723-40D0-A6BB-4CB8C3CAB9D0}" type="datetimeFigureOut">
               <a:rPr lang="en-US" smtClean="0"/>
-              <a:t>5/19/2023</a:t>
+              <a:t>5/22/2023</a:t>
             </a:fld>
             <a:endParaRPr lang="en-US"/>
           </a:p>
@@ -1719,7 +1785,7 @@
           <a:p>
             <a:fld id="{00BA600E-F723-40D0-A6BB-4CB8C3CAB9D0}" type="datetimeFigureOut">
               <a:rPr lang="en-US" smtClean="0"/>
-              <a:t>5/19/2023</a:t>
+              <a:t>5/22/2023</a:t>
             </a:fld>
             <a:endParaRPr lang="en-US"/>
           </a:p>
@@ -1814,7 +1880,7 @@
           <a:p>
             <a:fld id="{00BA600E-F723-40D0-A6BB-4CB8C3CAB9D0}" type="datetimeFigureOut">
               <a:rPr lang="en-US" smtClean="0"/>
-              <a:t>5/19/2023</a:t>
+              <a:t>5/22/2023</a:t>
             </a:fld>
             <a:endParaRPr lang="en-US"/>
           </a:p>
@@ -2091,7 +2157,7 @@
           <a:p>
             <a:fld id="{00BA600E-F723-40D0-A6BB-4CB8C3CAB9D0}" type="datetimeFigureOut">
               <a:rPr lang="en-US" smtClean="0"/>
-              <a:t>5/19/2023</a:t>
+              <a:t>5/22/2023</a:t>
             </a:fld>
             <a:endParaRPr lang="en-US"/>
           </a:p>
@@ -2348,7 +2414,7 @@
           <a:p>
             <a:fld id="{00BA600E-F723-40D0-A6BB-4CB8C3CAB9D0}" type="datetimeFigureOut">
               <a:rPr lang="en-US" smtClean="0"/>
-              <a:t>5/19/2023</a:t>
+              <a:t>5/22/2023</a:t>
             </a:fld>
             <a:endParaRPr lang="en-US"/>
           </a:p>
@@ -2561,7 +2627,7 @@
           <a:p>
             <a:fld id="{00BA600E-F723-40D0-A6BB-4CB8C3CAB9D0}" type="datetimeFigureOut">
               <a:rPr lang="en-US" smtClean="0"/>
-              <a:t>5/19/2023</a:t>
+              <a:t>5/22/2023</a:t>
             </a:fld>
             <a:endParaRPr lang="en-US"/>
           </a:p>
@@ -2968,10 +3034,10 @@
       </p:grpSpPr>
       <p:pic>
         <p:nvPicPr>
-          <p:cNvPr id="3" name="Picture 2" descr="A screenshot of a computer screen&#10;&#10;Description automatically generated with medium confidence">
+          <p:cNvPr id="17" name="Picture 16" descr="A screenshot of a computer screen&#10;&#10;Description automatically generated with medium confidence">
             <a:extLst>
               <a:ext uri="{FF2B5EF4-FFF2-40B4-BE49-F238E27FC236}">
-                <a16:creationId xmlns:a16="http://schemas.microsoft.com/office/drawing/2014/main" id="{0EBFA541-23B8-F0D8-3AAC-1C641621B48D}"/>
+                <a16:creationId xmlns:a16="http://schemas.microsoft.com/office/drawing/2014/main" id="{49B2A806-62BA-BB21-47C4-4A70E7D046E7}"/>
               </a:ext>
             </a:extLst>
           </p:cNvPr>

</xml_diff>